<commit_message>
updated chapter07 march 2
</commit_message>
<xml_diff>
--- a/ZeroToCognitive-master/Chapter07/Documentation/BluemixWatsonStartup Chapter07.pptx
+++ b/ZeroToCognitive-master/Chapter07/Documentation/BluemixWatsonStartup Chapter07.pptx
@@ -16,6 +16,7 @@
     <p:sldId id="261" r:id="rId13"/>
     <p:sldId id="262" r:id="rId14"/>
     <p:sldId id="263" r:id="rId15"/>
+    <p:sldId id="264" r:id="rId16"/>
   </p:sldIdLst>
   <p:sldSz cx="12192000" cy="6858000"/>
   <p:notesSz cx="6858000" cy="9144000"/>
@@ -6435,6 +6436,213 @@
         <p:nvSpPr>
           <p:cNvPr id="213" name="Shape 213"/>
           <p:cNvSpPr/>
+          <p:nvPr>
+            <p:ph type="title"/>
+          </p:nvPr>
+        </p:nvSpPr>
+        <p:spPr>
+          <a:prstGeom prst="rect">
+            <a:avLst/>
+          </a:prstGeom>
+        </p:spPr>
+        <p:txBody>
+          <a:bodyPr/>
+          <a:lstStyle/>
+          <a:p>
+            <a:pPr/>
+            <a:r>
+              <a:t>You will need to create certificate files. </a:t>
+            </a:r>
+          </a:p>
+        </p:txBody>
+      </p:sp>
+      <p:sp>
+        <p:nvSpPr>
+          <p:cNvPr id="214" name="Shape 214"/>
+          <p:cNvSpPr/>
+          <p:nvPr>
+            <p:ph type="body" idx="1"/>
+          </p:nvPr>
+        </p:nvSpPr>
+        <p:spPr>
+          <a:prstGeom prst="rect">
+            <a:avLst/>
+          </a:prstGeom>
+        </p:spPr>
+        <p:txBody>
+          <a:bodyPr/>
+          <a:lstStyle/>
+          <a:p>
+            <a:pPr/>
+            <a:r>
+              <a:t>This information is also in the index.js file for Chapter 7: </a:t>
+            </a:r>
+          </a:p>
+          <a:p>
+            <a:pPr/>
+          </a:p>
+          <a:p>
+            <a:pPr marL="0" indent="0">
+              <a:buSzTx/>
+              <a:buFontTx/>
+              <a:buNone/>
+            </a:pPr>
+          </a:p>
+          <a:p>
+            <a:pPr marL="200526" indent="-200526">
+              <a:buFontTx/>
+              <a:buChar char="•"/>
+            </a:pPr>
+            <a:r>
+              <a:t>for information on how to enable https support in osx, go here:</a:t>
+            </a:r>
+          </a:p>
+          <a:p>
+            <a:pPr marL="0" indent="0">
+              <a:buSzTx/>
+              <a:buFontTx/>
+              <a:buNone/>
+            </a:pPr>
+            <a:r>
+              <a:t>  </a:t>
+            </a:r>
+            <a:r>
+              <a:rPr u="sng">
+                <a:solidFill>
+                  <a:srgbClr val="00B2EF"/>
+                </a:solidFill>
+                <a:uFill>
+                  <a:solidFill>
+                    <a:srgbClr val="00B2EF"/>
+                  </a:solidFill>
+                </a:uFill>
+                <a:hlinkClick r:id="rId2" invalidUrl="" action="" tgtFrame="" tooltip="" history="1" highlightClick="0" endSnd="0"/>
+              </a:rPr>
+              <a:t>https://gist.github.com/nrollr/4daba07c67adcb30693e</a:t>
+            </a:r>
+          </a:p>
+          <a:p>
+            <a:pPr marL="0" indent="0">
+              <a:buSzTx/>
+              <a:buFontTx/>
+              <a:buNone/>
+            </a:pPr>
+          </a:p>
+          <a:p>
+            <a:pPr marL="200526" indent="-200526">
+              <a:buFontTx/>
+              <a:buChar char="•"/>
+            </a:pPr>
+            <a:r>
+              <a:t>Execute the following commands to create the necessary certificate files. You should be in the Chapter07 folder when you execute these commands. If you are running Linux, you will need to preface each command with </a:t>
+            </a:r>
+            <a:r>
+              <a:rPr b="1"/>
+              <a:t>sudo </a:t>
+            </a:r>
+            <a:r>
+              <a:t> and then provide your login password when prompted. </a:t>
+            </a:r>
+          </a:p>
+          <a:p>
+            <a:pPr marL="200526" indent="-200526">
+              <a:buFontTx/>
+              <a:buChar char="•"/>
+            </a:pPr>
+          </a:p>
+          <a:p>
+            <a:pPr marL="0" indent="0">
+              <a:buSzTx/>
+              <a:buFontTx/>
+              <a:buNone/>
+            </a:pPr>
+            <a:r>
+              <a:t>openssl genrsa -out key.pem</a:t>
+            </a:r>
+          </a:p>
+          <a:p>
+            <a:pPr marL="0" indent="0">
+              <a:buSzTx/>
+              <a:buFontTx/>
+              <a:buNone/>
+            </a:pPr>
+            <a:r>
+              <a:t>openssl req -new -key key.pem -out csr.pem</a:t>
+            </a:r>
+          </a:p>
+          <a:p>
+            <a:pPr marL="0" indent="0">
+              <a:buSzTx/>
+              <a:buFontTx/>
+              <a:buNone/>
+            </a:pPr>
+            <a:r>
+              <a:t>openssl x509 -req -days 9999 -in csr.pem -signkey key.pem -out cert.pem</a:t>
+            </a:r>
+          </a:p>
+        </p:txBody>
+      </p:sp>
+      <p:sp>
+        <p:nvSpPr>
+          <p:cNvPr id="215" name="Shape 215"/>
+          <p:cNvSpPr/>
+          <p:nvPr>
+            <p:ph type="sldNum" sz="quarter" idx="2"/>
+          </p:nvPr>
+        </p:nvSpPr>
+        <p:spPr>
+          <a:xfrm>
+            <a:off x="464953" y="6553200"/>
+            <a:ext cx="127001" cy="152400"/>
+          </a:xfrm>
+          <a:prstGeom prst="rect">
+            <a:avLst/>
+          </a:prstGeom>
+          <a:extLst>
+            <a:ext uri="{C572A759-6A51-4108-AA02-DFA0A04FC94B}">
+              <ma14:wrappingTextBoxFlag xmlns:ma14="http://schemas.microsoft.com/office/mac/drawingml/2011/main" val="1"/>
+            </a:ext>
+          </a:extLst>
+        </p:spPr>
+        <p:txBody>
+          <a:bodyPr/>
+          <a:lstStyle/>
+          <a:p>
+            <a:pPr/>
+            <a:fld id="{86CB4B4D-7CA3-9044-876B-883B54F8677D}" type="slidenum"/>
+          </a:p>
+        </p:txBody>
+      </p:sp>
+    </p:spTree>
+  </p:cSld>
+  <p:clrMapOvr>
+    <a:masterClrMapping/>
+  </p:clrMapOvr>
+  <p:transition xmlns:p14="http://schemas.microsoft.com/office/powerpoint/2010/main" spd="med" advClick="1"/>
+</p:sld>
+</file>
+
+<file path=ppt/slides/slide8.xml><?xml version="1.0" encoding="utf-8"?>
+<p:sld xmlns:a="http://schemas.openxmlformats.org/drawingml/2006/main" xmlns:r="http://schemas.openxmlformats.org/officeDocument/2006/relationships" xmlns:p="http://schemas.openxmlformats.org/presentationml/2006/main" showMasterSp="1" showMasterPhAnim="1">
+  <p:cSld>
+    <p:spTree>
+      <p:nvGrpSpPr>
+        <p:cNvPr id="1" name=""/>
+        <p:cNvGrpSpPr/>
+        <p:nvPr/>
+      </p:nvGrpSpPr>
+      <p:grpSpPr>
+        <a:xfrm>
+          <a:off x="0" y="0"/>
+          <a:ext cx="0" cy="0"/>
+          <a:chOff x="0" y="0"/>
+          <a:chExt cx="0" cy="0"/>
+        </a:xfrm>
+      </p:grpSpPr>
+      <p:sp>
+        <p:nvSpPr>
+          <p:cNvPr id="217" name="Shape 217"/>
+          <p:cNvSpPr/>
           <p:nvPr/>
         </p:nvSpPr>
         <p:spPr>
@@ -6502,7 +6710,7 @@
       </p:sp>
       <p:sp>
         <p:nvSpPr>
-          <p:cNvPr id="214" name="Shape 214"/>
+          <p:cNvPr id="218" name="Shape 218"/>
           <p:cNvSpPr/>
           <p:nvPr/>
         </p:nvSpPr>
@@ -6571,7 +6779,7 @@
       </p:sp>
       <p:sp>
         <p:nvSpPr>
-          <p:cNvPr id="215" name="Shape 215"/>
+          <p:cNvPr id="219" name="Shape 219"/>
           <p:cNvSpPr/>
           <p:nvPr/>
         </p:nvSpPr>
@@ -6628,7 +6836,7 @@
       </p:sp>
       <p:sp>
         <p:nvSpPr>
-          <p:cNvPr id="216" name="Shape 216"/>
+          <p:cNvPr id="220" name="Shape 220"/>
           <p:cNvSpPr/>
           <p:nvPr>
             <p:ph type="title"/>
@@ -6656,7 +6864,7 @@
       </p:sp>
       <p:sp>
         <p:nvSpPr>
-          <p:cNvPr id="217" name="Shape 217"/>
+          <p:cNvPr id="221" name="Shape 221"/>
           <p:cNvSpPr/>
           <p:nvPr>
             <p:ph type="body" idx="1"/>
@@ -6902,7 +7110,7 @@
       </p:sp>
       <p:sp>
         <p:nvSpPr>
-          <p:cNvPr id="218" name="Shape 218"/>
+          <p:cNvPr id="222" name="Shape 222"/>
           <p:cNvSpPr/>
           <p:nvPr>
             <p:ph type="sldNum" sz="quarter" idx="2"/>
@@ -6933,7 +7141,7 @@
       </p:sp>
       <p:sp>
         <p:nvSpPr>
-          <p:cNvPr id="219" name="Shape 219"/>
+          <p:cNvPr id="223" name="Shape 223"/>
           <p:cNvSpPr/>
           <p:nvPr/>
         </p:nvSpPr>
@@ -6969,7 +7177,7 @@
 </p:sld>
 </file>
 
-<file path=ppt/slides/slide8.xml><?xml version="1.0" encoding="utf-8"?>
+<file path=ppt/slides/slide9.xml><?xml version="1.0" encoding="utf-8"?>
 <p:sld xmlns:a="http://schemas.openxmlformats.org/drawingml/2006/main" xmlns:r="http://schemas.openxmlformats.org/officeDocument/2006/relationships" xmlns:p="http://schemas.openxmlformats.org/presentationml/2006/main" showMasterSp="1" showMasterPhAnim="1">
   <p:cSld>
     <p:spTree>
@@ -6988,7 +7196,7 @@
       </p:grpSpPr>
       <p:sp>
         <p:nvSpPr>
-          <p:cNvPr id="221" name="Shape 221"/>
+          <p:cNvPr id="225" name="Shape 225"/>
           <p:cNvSpPr/>
           <p:nvPr>
             <p:ph type="body" sz="quarter" idx="1"/>
@@ -7019,7 +7227,7 @@
       </p:sp>
       <p:sp>
         <p:nvSpPr>
-          <p:cNvPr id="222" name="Shape 222"/>
+          <p:cNvPr id="226" name="Shape 226"/>
           <p:cNvSpPr/>
           <p:nvPr>
             <p:ph type="body" idx="13"/>
@@ -7062,7 +7270,7 @@
       </p:sp>
       <p:sp>
         <p:nvSpPr>
-          <p:cNvPr id="223" name="Shape 223"/>
+          <p:cNvPr id="227" name="Shape 227"/>
           <p:cNvSpPr/>
           <p:nvPr>
             <p:ph type="title"/>

</xml_diff>